<commit_message>
Editorial task: Update instances-modules-declarations-01.png to add expansion module
</commit_message>
<xml_diff>
--- a/specification/resources/topic-arch-diagram.pptx
+++ b/specification/resources/topic-arch-diagram.pptx
@@ -4,6 +4,9 @@
   <p:sldMasterIdLst>
     <p:sldMasterId id="2147483648" r:id="rId1"/>
   </p:sldMasterIdLst>
+  <p:notesMasterIdLst>
+    <p:notesMasterId r:id="rId4"/>
+  </p:notesMasterIdLst>
   <p:sldIdLst>
     <p:sldId id="290" r:id="rId2"/>
     <p:sldId id="288" r:id="rId3"/>
@@ -105,7 +108,456 @@
       </a:defRPr>
     </a:lvl9pPr>
   </p:defaultTextStyle>
+  <p:extLst>
+    <p:ext uri="{EFAFB233-063F-42B5-8137-9DF3F51BA10A}">
+      <p15:sldGuideLst xmlns:p15="http://schemas.microsoft.com/office/powerpoint/2012/main">
+        <p15:guide id="1" orient="horz" pos="2160">
+          <p15:clr>
+            <a:srgbClr val="A4A3A4"/>
+          </p15:clr>
+        </p15:guide>
+        <p15:guide id="2" pos="2880">
+          <p15:clr>
+            <a:srgbClr val="A4A3A4"/>
+          </p15:clr>
+        </p15:guide>
+      </p15:sldGuideLst>
+    </p:ext>
+  </p:extLst>
 </p:presentation>
+</file>
+
+<file path=ppt/notesMasters/notesMaster1.xml><?xml version="1.0" encoding="utf-8"?>
+<p:notesMaster xmlns:a="http://schemas.openxmlformats.org/drawingml/2006/main" xmlns:r="http://schemas.openxmlformats.org/officeDocument/2006/relationships" xmlns:p="http://schemas.openxmlformats.org/presentationml/2006/main">
+  <p:cSld>
+    <p:bg>
+      <p:bgRef idx="1001">
+        <a:schemeClr val="bg1"/>
+      </p:bgRef>
+    </p:bg>
+    <p:spTree>
+      <p:nvGrpSpPr>
+        <p:cNvPr id="1" name=""/>
+        <p:cNvGrpSpPr/>
+        <p:nvPr/>
+      </p:nvGrpSpPr>
+      <p:grpSpPr>
+        <a:xfrm>
+          <a:off x="0" y="0"/>
+          <a:ext cx="0" cy="0"/>
+          <a:chOff x="0" y="0"/>
+          <a:chExt cx="0" cy="0"/>
+        </a:xfrm>
+      </p:grpSpPr>
+      <p:sp>
+        <p:nvSpPr>
+          <p:cNvPr id="2" name="Header Placeholder 1"/>
+          <p:cNvSpPr>
+            <a:spLocks noGrp="1"/>
+          </p:cNvSpPr>
+          <p:nvPr>
+            <p:ph type="hdr" sz="quarter"/>
+          </p:nvPr>
+        </p:nvSpPr>
+        <p:spPr>
+          <a:xfrm>
+            <a:off x="0" y="0"/>
+            <a:ext cx="2971800" cy="458788"/>
+          </a:xfrm>
+          <a:prstGeom prst="rect">
+            <a:avLst/>
+          </a:prstGeom>
+        </p:spPr>
+        <p:txBody>
+          <a:bodyPr vert="horz" lIns="91440" tIns="45720" rIns="91440" bIns="45720" rtlCol="0"/>
+          <a:lstStyle>
+            <a:lvl1pPr algn="l">
+              <a:defRPr sz="1200"/>
+            </a:lvl1pPr>
+          </a:lstStyle>
+          <a:p>
+            <a:endParaRPr lang="en-US"/>
+          </a:p>
+        </p:txBody>
+      </p:sp>
+      <p:sp>
+        <p:nvSpPr>
+          <p:cNvPr id="3" name="Date Placeholder 2"/>
+          <p:cNvSpPr>
+            <a:spLocks noGrp="1"/>
+          </p:cNvSpPr>
+          <p:nvPr>
+            <p:ph type="dt" idx="1"/>
+          </p:nvPr>
+        </p:nvSpPr>
+        <p:spPr>
+          <a:xfrm>
+            <a:off x="3884613" y="0"/>
+            <a:ext cx="2971800" cy="458788"/>
+          </a:xfrm>
+          <a:prstGeom prst="rect">
+            <a:avLst/>
+          </a:prstGeom>
+        </p:spPr>
+        <p:txBody>
+          <a:bodyPr vert="horz" lIns="91440" tIns="45720" rIns="91440" bIns="45720" rtlCol="0"/>
+          <a:lstStyle>
+            <a:lvl1pPr algn="r">
+              <a:defRPr sz="1200"/>
+            </a:lvl1pPr>
+          </a:lstStyle>
+          <a:p>
+            <a:fld id="{DE79F4FF-2931-1847-A0E7-74AD0A1585AB}" type="datetimeFigureOut">
+              <a:rPr lang="en-US" smtClean="0"/>
+              <a:t>10/15/22</a:t>
+            </a:fld>
+            <a:endParaRPr lang="en-US"/>
+          </a:p>
+        </p:txBody>
+      </p:sp>
+      <p:sp>
+        <p:nvSpPr>
+          <p:cNvPr id="4" name="Slide Image Placeholder 3"/>
+          <p:cNvSpPr>
+            <a:spLocks noGrp="1" noRot="1" noChangeAspect="1"/>
+          </p:cNvSpPr>
+          <p:nvPr>
+            <p:ph type="sldImg" idx="2"/>
+          </p:nvPr>
+        </p:nvSpPr>
+        <p:spPr>
+          <a:xfrm>
+            <a:off x="1371600" y="1143000"/>
+            <a:ext cx="4114800" cy="3086100"/>
+          </a:xfrm>
+          <a:prstGeom prst="rect">
+            <a:avLst/>
+          </a:prstGeom>
+          <a:noFill/>
+          <a:ln w="12700">
+            <a:solidFill>
+              <a:prstClr val="black"/>
+            </a:solidFill>
+          </a:ln>
+        </p:spPr>
+        <p:txBody>
+          <a:bodyPr vert="horz" lIns="91440" tIns="45720" rIns="91440" bIns="45720" rtlCol="0" anchor="ctr"/>
+          <a:lstStyle/>
+          <a:p>
+            <a:endParaRPr lang="en-US"/>
+          </a:p>
+        </p:txBody>
+      </p:sp>
+      <p:sp>
+        <p:nvSpPr>
+          <p:cNvPr id="5" name="Notes Placeholder 4"/>
+          <p:cNvSpPr>
+            <a:spLocks noGrp="1"/>
+          </p:cNvSpPr>
+          <p:nvPr>
+            <p:ph type="body" sz="quarter" idx="3"/>
+          </p:nvPr>
+        </p:nvSpPr>
+        <p:spPr>
+          <a:xfrm>
+            <a:off x="685800" y="4400550"/>
+            <a:ext cx="5486400" cy="3600450"/>
+          </a:xfrm>
+          <a:prstGeom prst="rect">
+            <a:avLst/>
+          </a:prstGeom>
+        </p:spPr>
+        <p:txBody>
+          <a:bodyPr vert="horz" lIns="91440" tIns="45720" rIns="91440" bIns="45720" rtlCol="0"/>
+          <a:lstStyle/>
+          <a:p>
+            <a:pPr lvl="0"/>
+            <a:r>
+              <a:rPr lang="en-US"/>
+              <a:t>Click to edit Master text styles</a:t>
+            </a:r>
+          </a:p>
+          <a:p>
+            <a:pPr lvl="1"/>
+            <a:r>
+              <a:rPr lang="en-US"/>
+              <a:t>Second level</a:t>
+            </a:r>
+          </a:p>
+          <a:p>
+            <a:pPr lvl="2"/>
+            <a:r>
+              <a:rPr lang="en-US"/>
+              <a:t>Third level</a:t>
+            </a:r>
+          </a:p>
+          <a:p>
+            <a:pPr lvl="3"/>
+            <a:r>
+              <a:rPr lang="en-US"/>
+              <a:t>Fourth level</a:t>
+            </a:r>
+          </a:p>
+          <a:p>
+            <a:pPr lvl="4"/>
+            <a:r>
+              <a:rPr lang="en-US"/>
+              <a:t>Fifth level</a:t>
+            </a:r>
+          </a:p>
+        </p:txBody>
+      </p:sp>
+      <p:sp>
+        <p:nvSpPr>
+          <p:cNvPr id="6" name="Footer Placeholder 5"/>
+          <p:cNvSpPr>
+            <a:spLocks noGrp="1"/>
+          </p:cNvSpPr>
+          <p:nvPr>
+            <p:ph type="ftr" sz="quarter" idx="4"/>
+          </p:nvPr>
+        </p:nvSpPr>
+        <p:spPr>
+          <a:xfrm>
+            <a:off x="0" y="8685213"/>
+            <a:ext cx="2971800" cy="458787"/>
+          </a:xfrm>
+          <a:prstGeom prst="rect">
+            <a:avLst/>
+          </a:prstGeom>
+        </p:spPr>
+        <p:txBody>
+          <a:bodyPr vert="horz" lIns="91440" tIns="45720" rIns="91440" bIns="45720" rtlCol="0" anchor="b"/>
+          <a:lstStyle>
+            <a:lvl1pPr algn="l">
+              <a:defRPr sz="1200"/>
+            </a:lvl1pPr>
+          </a:lstStyle>
+          <a:p>
+            <a:endParaRPr lang="en-US"/>
+          </a:p>
+        </p:txBody>
+      </p:sp>
+      <p:sp>
+        <p:nvSpPr>
+          <p:cNvPr id="7" name="Slide Number Placeholder 6"/>
+          <p:cNvSpPr>
+            <a:spLocks noGrp="1"/>
+          </p:cNvSpPr>
+          <p:nvPr>
+            <p:ph type="sldNum" sz="quarter" idx="5"/>
+          </p:nvPr>
+        </p:nvSpPr>
+        <p:spPr>
+          <a:xfrm>
+            <a:off x="3884613" y="8685213"/>
+            <a:ext cx="2971800" cy="458787"/>
+          </a:xfrm>
+          <a:prstGeom prst="rect">
+            <a:avLst/>
+          </a:prstGeom>
+        </p:spPr>
+        <p:txBody>
+          <a:bodyPr vert="horz" lIns="91440" tIns="45720" rIns="91440" bIns="45720" rtlCol="0" anchor="b"/>
+          <a:lstStyle>
+            <a:lvl1pPr algn="r">
+              <a:defRPr sz="1200"/>
+            </a:lvl1pPr>
+          </a:lstStyle>
+          <a:p>
+            <a:fld id="{EA54072C-E081-FA4E-90AD-FB89ADFA75C1}" type="slidenum">
+              <a:rPr lang="en-US" smtClean="0"/>
+              <a:t>‹#›</a:t>
+            </a:fld>
+            <a:endParaRPr lang="en-US"/>
+          </a:p>
+        </p:txBody>
+      </p:sp>
+    </p:spTree>
+    <p:extLst>
+      <p:ext uri="{BB962C8B-B14F-4D97-AF65-F5344CB8AC3E}">
+        <p14:creationId xmlns:p14="http://schemas.microsoft.com/office/powerpoint/2010/main" val="2329322738"/>
+      </p:ext>
+    </p:extLst>
+  </p:cSld>
+  <p:clrMap bg1="lt1" tx1="dk1" bg2="lt2" tx2="dk2" accent1="accent1" accent2="accent2" accent3="accent3" accent4="accent4" accent5="accent5" accent6="accent6" hlink="hlink" folHlink="folHlink"/>
+  <p:notesStyle>
+    <a:lvl1pPr marL="0" algn="l" defTabSz="914400" rtl="0" eaLnBrk="1" latinLnBrk="0" hangingPunct="1">
+      <a:defRPr sz="1200" kern="1200">
+        <a:solidFill>
+          <a:schemeClr val="tx1"/>
+        </a:solidFill>
+        <a:latin typeface="+mn-lt"/>
+        <a:ea typeface="+mn-ea"/>
+        <a:cs typeface="+mn-cs"/>
+      </a:defRPr>
+    </a:lvl1pPr>
+    <a:lvl2pPr marL="457200" algn="l" defTabSz="914400" rtl="0" eaLnBrk="1" latinLnBrk="0" hangingPunct="1">
+      <a:defRPr sz="1200" kern="1200">
+        <a:solidFill>
+          <a:schemeClr val="tx1"/>
+        </a:solidFill>
+        <a:latin typeface="+mn-lt"/>
+        <a:ea typeface="+mn-ea"/>
+        <a:cs typeface="+mn-cs"/>
+      </a:defRPr>
+    </a:lvl2pPr>
+    <a:lvl3pPr marL="914400" algn="l" defTabSz="914400" rtl="0" eaLnBrk="1" latinLnBrk="0" hangingPunct="1">
+      <a:defRPr sz="1200" kern="1200">
+        <a:solidFill>
+          <a:schemeClr val="tx1"/>
+        </a:solidFill>
+        <a:latin typeface="+mn-lt"/>
+        <a:ea typeface="+mn-ea"/>
+        <a:cs typeface="+mn-cs"/>
+      </a:defRPr>
+    </a:lvl3pPr>
+    <a:lvl4pPr marL="1371600" algn="l" defTabSz="914400" rtl="0" eaLnBrk="1" latinLnBrk="0" hangingPunct="1">
+      <a:defRPr sz="1200" kern="1200">
+        <a:solidFill>
+          <a:schemeClr val="tx1"/>
+        </a:solidFill>
+        <a:latin typeface="+mn-lt"/>
+        <a:ea typeface="+mn-ea"/>
+        <a:cs typeface="+mn-cs"/>
+      </a:defRPr>
+    </a:lvl4pPr>
+    <a:lvl5pPr marL="1828800" algn="l" defTabSz="914400" rtl="0" eaLnBrk="1" latinLnBrk="0" hangingPunct="1">
+      <a:defRPr sz="1200" kern="1200">
+        <a:solidFill>
+          <a:schemeClr val="tx1"/>
+        </a:solidFill>
+        <a:latin typeface="+mn-lt"/>
+        <a:ea typeface="+mn-ea"/>
+        <a:cs typeface="+mn-cs"/>
+      </a:defRPr>
+    </a:lvl5pPr>
+    <a:lvl6pPr marL="2286000" algn="l" defTabSz="914400" rtl="0" eaLnBrk="1" latinLnBrk="0" hangingPunct="1">
+      <a:defRPr sz="1200" kern="1200">
+        <a:solidFill>
+          <a:schemeClr val="tx1"/>
+        </a:solidFill>
+        <a:latin typeface="+mn-lt"/>
+        <a:ea typeface="+mn-ea"/>
+        <a:cs typeface="+mn-cs"/>
+      </a:defRPr>
+    </a:lvl6pPr>
+    <a:lvl7pPr marL="2743200" algn="l" defTabSz="914400" rtl="0" eaLnBrk="1" latinLnBrk="0" hangingPunct="1">
+      <a:defRPr sz="1200" kern="1200">
+        <a:solidFill>
+          <a:schemeClr val="tx1"/>
+        </a:solidFill>
+        <a:latin typeface="+mn-lt"/>
+        <a:ea typeface="+mn-ea"/>
+        <a:cs typeface="+mn-cs"/>
+      </a:defRPr>
+    </a:lvl7pPr>
+    <a:lvl8pPr marL="3200400" algn="l" defTabSz="914400" rtl="0" eaLnBrk="1" latinLnBrk="0" hangingPunct="1">
+      <a:defRPr sz="1200" kern="1200">
+        <a:solidFill>
+          <a:schemeClr val="tx1"/>
+        </a:solidFill>
+        <a:latin typeface="+mn-lt"/>
+        <a:ea typeface="+mn-ea"/>
+        <a:cs typeface="+mn-cs"/>
+      </a:defRPr>
+    </a:lvl8pPr>
+    <a:lvl9pPr marL="3657600" algn="l" defTabSz="914400" rtl="0" eaLnBrk="1" latinLnBrk="0" hangingPunct="1">
+      <a:defRPr sz="1200" kern="1200">
+        <a:solidFill>
+          <a:schemeClr val="tx1"/>
+        </a:solidFill>
+        <a:latin typeface="+mn-lt"/>
+        <a:ea typeface="+mn-ea"/>
+        <a:cs typeface="+mn-cs"/>
+      </a:defRPr>
+    </a:lvl9pPr>
+  </p:notesStyle>
+</p:notesMaster>
+</file>
+
+<file path=ppt/notesSlides/notesSlide1.xml><?xml version="1.0" encoding="utf-8"?>
+<p:notes xmlns:a="http://schemas.openxmlformats.org/drawingml/2006/main" xmlns:r="http://schemas.openxmlformats.org/officeDocument/2006/relationships" xmlns:p="http://schemas.openxmlformats.org/presentationml/2006/main">
+  <p:cSld>
+    <p:spTree>
+      <p:nvGrpSpPr>
+        <p:cNvPr id="1" name=""/>
+        <p:cNvGrpSpPr/>
+        <p:nvPr/>
+      </p:nvGrpSpPr>
+      <p:grpSpPr>
+        <a:xfrm>
+          <a:off x="0" y="0"/>
+          <a:ext cx="0" cy="0"/>
+          <a:chOff x="0" y="0"/>
+          <a:chExt cx="0" cy="0"/>
+        </a:xfrm>
+      </p:grpSpPr>
+      <p:sp>
+        <p:nvSpPr>
+          <p:cNvPr id="2" name="Slide Image Placeholder 1"/>
+          <p:cNvSpPr>
+            <a:spLocks noGrp="1" noRot="1" noChangeAspect="1"/>
+          </p:cNvSpPr>
+          <p:nvPr>
+            <p:ph type="sldImg"/>
+          </p:nvPr>
+        </p:nvSpPr>
+        <p:spPr/>
+      </p:sp>
+      <p:sp>
+        <p:nvSpPr>
+          <p:cNvPr id="3" name="Notes Placeholder 2"/>
+          <p:cNvSpPr>
+            <a:spLocks noGrp="1"/>
+          </p:cNvSpPr>
+          <p:nvPr>
+            <p:ph type="body" idx="1"/>
+          </p:nvPr>
+        </p:nvSpPr>
+        <p:spPr/>
+        <p:txBody>
+          <a:bodyPr/>
+          <a:lstStyle/>
+          <a:p>
+            <a:endParaRPr lang="en-US" dirty="0"/>
+          </a:p>
+        </p:txBody>
+      </p:sp>
+      <p:sp>
+        <p:nvSpPr>
+          <p:cNvPr id="4" name="Slide Number Placeholder 3"/>
+          <p:cNvSpPr>
+            <a:spLocks noGrp="1"/>
+          </p:cNvSpPr>
+          <p:nvPr>
+            <p:ph type="sldNum" sz="quarter" idx="5"/>
+          </p:nvPr>
+        </p:nvSpPr>
+        <p:spPr/>
+        <p:txBody>
+          <a:bodyPr/>
+          <a:lstStyle/>
+          <a:p>
+            <a:fld id="{EA54072C-E081-FA4E-90AD-FB89ADFA75C1}" type="slidenum">
+              <a:rPr lang="en-US" smtClean="0"/>
+              <a:t>1</a:t>
+            </a:fld>
+            <a:endParaRPr lang="en-US"/>
+          </a:p>
+        </p:txBody>
+      </p:sp>
+    </p:spTree>
+    <p:extLst>
+      <p:ext uri="{BB962C8B-B14F-4D97-AF65-F5344CB8AC3E}">
+        <p14:creationId xmlns:p14="http://schemas.microsoft.com/office/powerpoint/2010/main" val="2080821812"/>
+      </p:ext>
+    </p:extLst>
+  </p:cSld>
+  <p:clrMapOvr>
+    <a:masterClrMapping/>
+  </p:clrMapOvr>
+</p:notes>
 </file>
 
 <file path=ppt/slideLayouts/slideLayout1.xml><?xml version="1.0" encoding="utf-8"?>
@@ -146,10 +598,9 @@
           <a:lstStyle/>
           <a:p>
             <a:r>
-              <a:rPr lang="en-US" smtClean="0"/>
+              <a:rPr lang="en-US"/>
               <a:t>Click to edit Master title style</a:t>
             </a:r>
-            <a:endParaRPr lang="en-US"/>
           </a:p>
         </p:txBody>
       </p:sp>
@@ -265,10 +716,9 @@
           </a:lstStyle>
           <a:p>
             <a:r>
-              <a:rPr lang="en-US" smtClean="0"/>
+              <a:rPr lang="en-US"/>
               <a:t>Click to edit Master subtitle style</a:t>
             </a:r>
-            <a:endParaRPr lang="en-US"/>
           </a:p>
         </p:txBody>
       </p:sp>
@@ -290,7 +740,7 @@
             <a:fld id="{A94B0ED3-9239-47FD-960E-9967EEA0F07F}" type="datetimeFigureOut">
               <a:rPr lang="en-US" smtClean="0"/>
               <a:pPr/>
-              <a:t>8/4/2015</a:t>
+              <a:t>10/15/22</a:t>
             </a:fld>
             <a:endParaRPr lang="en-US" dirty="0"/>
           </a:p>
@@ -380,10 +830,9 @@
           <a:lstStyle/>
           <a:p>
             <a:r>
-              <a:rPr lang="en-US" smtClean="0"/>
+              <a:rPr lang="en-US"/>
               <a:t>Click to edit Master title style</a:t>
             </a:r>
-            <a:endParaRPr lang="en-US"/>
           </a:p>
         </p:txBody>
       </p:sp>
@@ -404,38 +853,37 @@
           <a:p>
             <a:pPr lvl="0"/>
             <a:r>
-              <a:rPr lang="en-US" smtClean="0"/>
+              <a:rPr lang="en-US"/>
               <a:t>Click to edit Master text styles</a:t>
             </a:r>
           </a:p>
           <a:p>
             <a:pPr lvl="1"/>
             <a:r>
-              <a:rPr lang="en-US" smtClean="0"/>
+              <a:rPr lang="en-US"/>
               <a:t>Second level</a:t>
             </a:r>
           </a:p>
           <a:p>
             <a:pPr lvl="2"/>
             <a:r>
-              <a:rPr lang="en-US" smtClean="0"/>
+              <a:rPr lang="en-US"/>
               <a:t>Third level</a:t>
             </a:r>
           </a:p>
           <a:p>
             <a:pPr lvl="3"/>
             <a:r>
-              <a:rPr lang="en-US" smtClean="0"/>
+              <a:rPr lang="en-US"/>
               <a:t>Fourth level</a:t>
             </a:r>
           </a:p>
           <a:p>
             <a:pPr lvl="4"/>
             <a:r>
-              <a:rPr lang="en-US" smtClean="0"/>
+              <a:rPr lang="en-US"/>
               <a:t>Fifth level</a:t>
             </a:r>
-            <a:endParaRPr lang="en-US"/>
           </a:p>
         </p:txBody>
       </p:sp>
@@ -457,7 +905,7 @@
             <a:fld id="{A94B0ED3-9239-47FD-960E-9967EEA0F07F}" type="datetimeFigureOut">
               <a:rPr lang="en-US" smtClean="0"/>
               <a:pPr/>
-              <a:t>8/4/2015</a:t>
+              <a:t>10/15/22</a:t>
             </a:fld>
             <a:endParaRPr lang="en-US" dirty="0"/>
           </a:p>
@@ -552,10 +1000,9 @@
           <a:lstStyle/>
           <a:p>
             <a:r>
-              <a:rPr lang="en-US" smtClean="0"/>
+              <a:rPr lang="en-US"/>
               <a:t>Click to edit Master title style</a:t>
             </a:r>
-            <a:endParaRPr lang="en-US"/>
           </a:p>
         </p:txBody>
       </p:sp>
@@ -581,38 +1028,37 @@
           <a:p>
             <a:pPr lvl="0"/>
             <a:r>
-              <a:rPr lang="en-US" smtClean="0"/>
+              <a:rPr lang="en-US"/>
               <a:t>Click to edit Master text styles</a:t>
             </a:r>
           </a:p>
           <a:p>
             <a:pPr lvl="1"/>
             <a:r>
-              <a:rPr lang="en-US" smtClean="0"/>
+              <a:rPr lang="en-US"/>
               <a:t>Second level</a:t>
             </a:r>
           </a:p>
           <a:p>
             <a:pPr lvl="2"/>
             <a:r>
-              <a:rPr lang="en-US" smtClean="0"/>
+              <a:rPr lang="en-US"/>
               <a:t>Third level</a:t>
             </a:r>
           </a:p>
           <a:p>
             <a:pPr lvl="3"/>
             <a:r>
-              <a:rPr lang="en-US" smtClean="0"/>
+              <a:rPr lang="en-US"/>
               <a:t>Fourth level</a:t>
             </a:r>
           </a:p>
           <a:p>
             <a:pPr lvl="4"/>
             <a:r>
-              <a:rPr lang="en-US" smtClean="0"/>
+              <a:rPr lang="en-US"/>
               <a:t>Fifth level</a:t>
             </a:r>
-            <a:endParaRPr lang="en-US"/>
           </a:p>
         </p:txBody>
       </p:sp>
@@ -634,7 +1080,7 @@
             <a:fld id="{A94B0ED3-9239-47FD-960E-9967EEA0F07F}" type="datetimeFigureOut">
               <a:rPr lang="en-US" smtClean="0"/>
               <a:pPr/>
-              <a:t>8/4/2015</a:t>
+              <a:t>10/15/22</a:t>
             </a:fld>
             <a:endParaRPr lang="en-US" dirty="0"/>
           </a:p>
@@ -724,10 +1170,9 @@
           <a:lstStyle/>
           <a:p>
             <a:r>
-              <a:rPr lang="en-US" smtClean="0"/>
+              <a:rPr lang="en-US"/>
               <a:t>Click to edit Master title style</a:t>
             </a:r>
-            <a:endParaRPr lang="en-US"/>
           </a:p>
         </p:txBody>
       </p:sp>
@@ -748,38 +1193,37 @@
           <a:p>
             <a:pPr lvl="0"/>
             <a:r>
-              <a:rPr lang="en-US" smtClean="0"/>
+              <a:rPr lang="en-US"/>
               <a:t>Click to edit Master text styles</a:t>
             </a:r>
           </a:p>
           <a:p>
             <a:pPr lvl="1"/>
             <a:r>
-              <a:rPr lang="en-US" smtClean="0"/>
+              <a:rPr lang="en-US"/>
               <a:t>Second level</a:t>
             </a:r>
           </a:p>
           <a:p>
             <a:pPr lvl="2"/>
             <a:r>
-              <a:rPr lang="en-US" smtClean="0"/>
+              <a:rPr lang="en-US"/>
               <a:t>Third level</a:t>
             </a:r>
           </a:p>
           <a:p>
             <a:pPr lvl="3"/>
             <a:r>
-              <a:rPr lang="en-US" smtClean="0"/>
+              <a:rPr lang="en-US"/>
               <a:t>Fourth level</a:t>
             </a:r>
           </a:p>
           <a:p>
             <a:pPr lvl="4"/>
             <a:r>
-              <a:rPr lang="en-US" smtClean="0"/>
+              <a:rPr lang="en-US"/>
               <a:t>Fifth level</a:t>
             </a:r>
-            <a:endParaRPr lang="en-US"/>
           </a:p>
         </p:txBody>
       </p:sp>
@@ -801,7 +1245,7 @@
             <a:fld id="{A94B0ED3-9239-47FD-960E-9967EEA0F07F}" type="datetimeFigureOut">
               <a:rPr lang="en-US" smtClean="0"/>
               <a:pPr/>
-              <a:t>8/4/2015</a:t>
+              <a:t>10/15/22</a:t>
             </a:fld>
             <a:endParaRPr lang="en-US" dirty="0"/>
           </a:p>
@@ -900,10 +1344,9 @@
           </a:lstStyle>
           <a:p>
             <a:r>
-              <a:rPr lang="en-US" smtClean="0"/>
+              <a:rPr lang="en-US"/>
               <a:t>Click to edit Master title style</a:t>
             </a:r>
-            <a:endParaRPr lang="en-US"/>
           </a:p>
         </p:txBody>
       </p:sp>
@@ -1020,7 +1463,7 @@
           <a:p>
             <a:pPr lvl="0"/>
             <a:r>
-              <a:rPr lang="en-US" smtClean="0"/>
+              <a:rPr lang="en-US"/>
               <a:t>Click to edit Master text styles</a:t>
             </a:r>
           </a:p>
@@ -1044,7 +1487,7 @@
             <a:fld id="{A94B0ED3-9239-47FD-960E-9967EEA0F07F}" type="datetimeFigureOut">
               <a:rPr lang="en-US" smtClean="0"/>
               <a:pPr/>
-              <a:t>8/4/2015</a:t>
+              <a:t>10/15/22</a:t>
             </a:fld>
             <a:endParaRPr lang="en-US" dirty="0"/>
           </a:p>
@@ -1134,10 +1577,9 @@
           <a:lstStyle/>
           <a:p>
             <a:r>
-              <a:rPr lang="en-US" smtClean="0"/>
+              <a:rPr lang="en-US"/>
               <a:t>Click to edit Master title style</a:t>
             </a:r>
-            <a:endParaRPr lang="en-US"/>
           </a:p>
         </p:txBody>
       </p:sp>
@@ -1191,38 +1633,37 @@
           <a:p>
             <a:pPr lvl="0"/>
             <a:r>
-              <a:rPr lang="en-US" smtClean="0"/>
+              <a:rPr lang="en-US"/>
               <a:t>Click to edit Master text styles</a:t>
             </a:r>
           </a:p>
           <a:p>
             <a:pPr lvl="1"/>
             <a:r>
-              <a:rPr lang="en-US" smtClean="0"/>
+              <a:rPr lang="en-US"/>
               <a:t>Second level</a:t>
             </a:r>
           </a:p>
           <a:p>
             <a:pPr lvl="2"/>
             <a:r>
-              <a:rPr lang="en-US" smtClean="0"/>
+              <a:rPr lang="en-US"/>
               <a:t>Third level</a:t>
             </a:r>
           </a:p>
           <a:p>
             <a:pPr lvl="3"/>
             <a:r>
-              <a:rPr lang="en-US" smtClean="0"/>
+              <a:rPr lang="en-US"/>
               <a:t>Fourth level</a:t>
             </a:r>
           </a:p>
           <a:p>
             <a:pPr lvl="4"/>
             <a:r>
-              <a:rPr lang="en-US" smtClean="0"/>
+              <a:rPr lang="en-US"/>
               <a:t>Fifth level</a:t>
             </a:r>
-            <a:endParaRPr lang="en-US"/>
           </a:p>
         </p:txBody>
       </p:sp>
@@ -1276,38 +1717,37 @@
           <a:p>
             <a:pPr lvl="0"/>
             <a:r>
-              <a:rPr lang="en-US" smtClean="0"/>
+              <a:rPr lang="en-US"/>
               <a:t>Click to edit Master text styles</a:t>
             </a:r>
           </a:p>
           <a:p>
             <a:pPr lvl="1"/>
             <a:r>
-              <a:rPr lang="en-US" smtClean="0"/>
+              <a:rPr lang="en-US"/>
               <a:t>Second level</a:t>
             </a:r>
           </a:p>
           <a:p>
             <a:pPr lvl="2"/>
             <a:r>
-              <a:rPr lang="en-US" smtClean="0"/>
+              <a:rPr lang="en-US"/>
               <a:t>Third level</a:t>
             </a:r>
           </a:p>
           <a:p>
             <a:pPr lvl="3"/>
             <a:r>
-              <a:rPr lang="en-US" smtClean="0"/>
+              <a:rPr lang="en-US"/>
               <a:t>Fourth level</a:t>
             </a:r>
           </a:p>
           <a:p>
             <a:pPr lvl="4"/>
             <a:r>
-              <a:rPr lang="en-US" smtClean="0"/>
+              <a:rPr lang="en-US"/>
               <a:t>Fifth level</a:t>
             </a:r>
-            <a:endParaRPr lang="en-US"/>
           </a:p>
         </p:txBody>
       </p:sp>
@@ -1329,7 +1769,7 @@
             <a:fld id="{A94B0ED3-9239-47FD-960E-9967EEA0F07F}" type="datetimeFigureOut">
               <a:rPr lang="en-US" smtClean="0"/>
               <a:pPr/>
-              <a:t>8/4/2015</a:t>
+              <a:t>10/15/22</a:t>
             </a:fld>
             <a:endParaRPr lang="en-US" dirty="0"/>
           </a:p>
@@ -1423,10 +1863,9 @@
           </a:lstStyle>
           <a:p>
             <a:r>
-              <a:rPr lang="en-US" smtClean="0"/>
+              <a:rPr lang="en-US"/>
               <a:t>Click to edit Master title style</a:t>
             </a:r>
-            <a:endParaRPr lang="en-US"/>
           </a:p>
         </p:txBody>
       </p:sp>
@@ -1489,7 +1928,7 @@
           <a:p>
             <a:pPr lvl="0"/>
             <a:r>
-              <a:rPr lang="en-US" smtClean="0"/>
+              <a:rPr lang="en-US"/>
               <a:t>Click to edit Master text styles</a:t>
             </a:r>
           </a:p>
@@ -1545,38 +1984,37 @@
           <a:p>
             <a:pPr lvl="0"/>
             <a:r>
-              <a:rPr lang="en-US" smtClean="0"/>
+              <a:rPr lang="en-US"/>
               <a:t>Click to edit Master text styles</a:t>
             </a:r>
           </a:p>
           <a:p>
             <a:pPr lvl="1"/>
             <a:r>
-              <a:rPr lang="en-US" smtClean="0"/>
+              <a:rPr lang="en-US"/>
               <a:t>Second level</a:t>
             </a:r>
           </a:p>
           <a:p>
             <a:pPr lvl="2"/>
             <a:r>
-              <a:rPr lang="en-US" smtClean="0"/>
+              <a:rPr lang="en-US"/>
               <a:t>Third level</a:t>
             </a:r>
           </a:p>
           <a:p>
             <a:pPr lvl="3"/>
             <a:r>
-              <a:rPr lang="en-US" smtClean="0"/>
+              <a:rPr lang="en-US"/>
               <a:t>Fourth level</a:t>
             </a:r>
           </a:p>
           <a:p>
             <a:pPr lvl="4"/>
             <a:r>
-              <a:rPr lang="en-US" smtClean="0"/>
+              <a:rPr lang="en-US"/>
               <a:t>Fifth level</a:t>
             </a:r>
-            <a:endParaRPr lang="en-US"/>
           </a:p>
         </p:txBody>
       </p:sp>
@@ -1639,7 +2077,7 @@
           <a:p>
             <a:pPr lvl="0"/>
             <a:r>
-              <a:rPr lang="en-US" smtClean="0"/>
+              <a:rPr lang="en-US"/>
               <a:t>Click to edit Master text styles</a:t>
             </a:r>
           </a:p>
@@ -1695,38 +2133,37 @@
           <a:p>
             <a:pPr lvl="0"/>
             <a:r>
-              <a:rPr lang="en-US" smtClean="0"/>
+              <a:rPr lang="en-US"/>
               <a:t>Click to edit Master text styles</a:t>
             </a:r>
           </a:p>
           <a:p>
             <a:pPr lvl="1"/>
             <a:r>
-              <a:rPr lang="en-US" smtClean="0"/>
+              <a:rPr lang="en-US"/>
               <a:t>Second level</a:t>
             </a:r>
           </a:p>
           <a:p>
             <a:pPr lvl="2"/>
             <a:r>
-              <a:rPr lang="en-US" smtClean="0"/>
+              <a:rPr lang="en-US"/>
               <a:t>Third level</a:t>
             </a:r>
           </a:p>
           <a:p>
             <a:pPr lvl="3"/>
             <a:r>
-              <a:rPr lang="en-US" smtClean="0"/>
+              <a:rPr lang="en-US"/>
               <a:t>Fourth level</a:t>
             </a:r>
           </a:p>
           <a:p>
             <a:pPr lvl="4"/>
             <a:r>
-              <a:rPr lang="en-US" smtClean="0"/>
+              <a:rPr lang="en-US"/>
               <a:t>Fifth level</a:t>
             </a:r>
-            <a:endParaRPr lang="en-US"/>
           </a:p>
         </p:txBody>
       </p:sp>
@@ -1748,7 +2185,7 @@
             <a:fld id="{A94B0ED3-9239-47FD-960E-9967EEA0F07F}" type="datetimeFigureOut">
               <a:rPr lang="en-US" smtClean="0"/>
               <a:pPr/>
-              <a:t>8/4/2015</a:t>
+              <a:t>10/15/22</a:t>
             </a:fld>
             <a:endParaRPr lang="en-US" dirty="0"/>
           </a:p>
@@ -1838,10 +2275,9 @@
           <a:lstStyle/>
           <a:p>
             <a:r>
-              <a:rPr lang="en-US" smtClean="0"/>
+              <a:rPr lang="en-US"/>
               <a:t>Click to edit Master title style</a:t>
             </a:r>
-            <a:endParaRPr lang="en-US"/>
           </a:p>
         </p:txBody>
       </p:sp>
@@ -1863,7 +2299,7 @@
             <a:fld id="{A94B0ED3-9239-47FD-960E-9967EEA0F07F}" type="datetimeFigureOut">
               <a:rPr lang="en-US" smtClean="0"/>
               <a:pPr/>
-              <a:t>8/4/2015</a:t>
+              <a:t>10/15/22</a:t>
             </a:fld>
             <a:endParaRPr lang="en-US" dirty="0"/>
           </a:p>
@@ -1955,7 +2391,7 @@
             <a:fld id="{A94B0ED3-9239-47FD-960E-9967EEA0F07F}" type="datetimeFigureOut">
               <a:rPr lang="en-US" smtClean="0"/>
               <a:pPr/>
-              <a:t>8/4/2015</a:t>
+              <a:t>10/15/22</a:t>
             </a:fld>
             <a:endParaRPr lang="en-US" dirty="0"/>
           </a:p>
@@ -2054,10 +2490,9 @@
           </a:lstStyle>
           <a:p>
             <a:r>
-              <a:rPr lang="en-US" smtClean="0"/>
+              <a:rPr lang="en-US"/>
               <a:t>Click to edit Master title style</a:t>
             </a:r>
-            <a:endParaRPr lang="en-US"/>
           </a:p>
         </p:txBody>
       </p:sp>
@@ -2111,38 +2546,37 @@
           <a:p>
             <a:pPr lvl="0"/>
             <a:r>
-              <a:rPr lang="en-US" smtClean="0"/>
+              <a:rPr lang="en-US"/>
               <a:t>Click to edit Master text styles</a:t>
             </a:r>
           </a:p>
           <a:p>
             <a:pPr lvl="1"/>
             <a:r>
-              <a:rPr lang="en-US" smtClean="0"/>
+              <a:rPr lang="en-US"/>
               <a:t>Second level</a:t>
             </a:r>
           </a:p>
           <a:p>
             <a:pPr lvl="2"/>
             <a:r>
-              <a:rPr lang="en-US" smtClean="0"/>
+              <a:rPr lang="en-US"/>
               <a:t>Third level</a:t>
             </a:r>
           </a:p>
           <a:p>
             <a:pPr lvl="3"/>
             <a:r>
-              <a:rPr lang="en-US" smtClean="0"/>
+              <a:rPr lang="en-US"/>
               <a:t>Fourth level</a:t>
             </a:r>
           </a:p>
           <a:p>
             <a:pPr lvl="4"/>
             <a:r>
-              <a:rPr lang="en-US" smtClean="0"/>
+              <a:rPr lang="en-US"/>
               <a:t>Fifth level</a:t>
             </a:r>
-            <a:endParaRPr lang="en-US"/>
           </a:p>
         </p:txBody>
       </p:sp>
@@ -2205,7 +2639,7 @@
           <a:p>
             <a:pPr lvl="0"/>
             <a:r>
-              <a:rPr lang="en-US" smtClean="0"/>
+              <a:rPr lang="en-US"/>
               <a:t>Click to edit Master text styles</a:t>
             </a:r>
           </a:p>
@@ -2229,7 +2663,7 @@
             <a:fld id="{A94B0ED3-9239-47FD-960E-9967EEA0F07F}" type="datetimeFigureOut">
               <a:rPr lang="en-US" smtClean="0"/>
               <a:pPr/>
-              <a:t>8/4/2015</a:t>
+              <a:t>10/15/22</a:t>
             </a:fld>
             <a:endParaRPr lang="en-US" dirty="0"/>
           </a:p>
@@ -2328,10 +2762,9 @@
           </a:lstStyle>
           <a:p>
             <a:r>
-              <a:rPr lang="en-US" smtClean="0"/>
+              <a:rPr lang="en-US"/>
               <a:t>Click to edit Master title style</a:t>
             </a:r>
-            <a:endParaRPr lang="en-US"/>
           </a:p>
         </p:txBody>
       </p:sp>
@@ -2455,7 +2888,7 @@
           <a:p>
             <a:pPr lvl="0"/>
             <a:r>
-              <a:rPr lang="en-US" smtClean="0"/>
+              <a:rPr lang="en-US"/>
               <a:t>Click to edit Master text styles</a:t>
             </a:r>
           </a:p>
@@ -2479,7 +2912,7 @@
             <a:fld id="{A94B0ED3-9239-47FD-960E-9967EEA0F07F}" type="datetimeFigureOut">
               <a:rPr lang="en-US" smtClean="0"/>
               <a:pPr/>
-              <a:t>8/4/2015</a:t>
+              <a:t>10/15/22</a:t>
             </a:fld>
             <a:endParaRPr lang="en-US" dirty="0"/>
           </a:p>
@@ -2584,10 +3017,9 @@
           <a:lstStyle/>
           <a:p>
             <a:r>
-              <a:rPr lang="en-US" smtClean="0"/>
+              <a:rPr lang="en-US"/>
               <a:t>Click to edit Master title style</a:t>
             </a:r>
-            <a:endParaRPr lang="en-US"/>
           </a:p>
         </p:txBody>
       </p:sp>
@@ -2618,38 +3050,37 @@
           <a:p>
             <a:pPr lvl="0"/>
             <a:r>
-              <a:rPr lang="en-US" smtClean="0"/>
+              <a:rPr lang="en-US"/>
               <a:t>Click to edit Master text styles</a:t>
             </a:r>
           </a:p>
           <a:p>
             <a:pPr lvl="1"/>
             <a:r>
-              <a:rPr lang="en-US" smtClean="0"/>
+              <a:rPr lang="en-US"/>
               <a:t>Second level</a:t>
             </a:r>
           </a:p>
           <a:p>
             <a:pPr lvl="2"/>
             <a:r>
-              <a:rPr lang="en-US" smtClean="0"/>
+              <a:rPr lang="en-US"/>
               <a:t>Third level</a:t>
             </a:r>
           </a:p>
           <a:p>
             <a:pPr lvl="3"/>
             <a:r>
-              <a:rPr lang="en-US" smtClean="0"/>
+              <a:rPr lang="en-US"/>
               <a:t>Fourth level</a:t>
             </a:r>
           </a:p>
           <a:p>
             <a:pPr lvl="4"/>
             <a:r>
-              <a:rPr lang="en-US" smtClean="0"/>
+              <a:rPr lang="en-US"/>
               <a:t>Fifth level</a:t>
             </a:r>
-            <a:endParaRPr lang="en-US"/>
           </a:p>
         </p:txBody>
       </p:sp>
@@ -2689,7 +3120,7 @@
             <a:fld id="{A94B0ED3-9239-47FD-960E-9967EEA0F07F}" type="datetimeFigureOut">
               <a:rPr lang="en-US" smtClean="0"/>
               <a:pPr/>
-              <a:t>8/4/2015</a:t>
+              <a:t>10/15/22</a:t>
             </a:fld>
             <a:endParaRPr lang="en-US" dirty="0"/>
           </a:p>
@@ -3160,17 +3591,8 @@
               <a:rPr lang="en-US" sz="1600" b="1" dirty="0">
                 <a:latin typeface="Calibri" pitchFamily="34" charset="0"/>
               </a:rPr>
-              <a:t>Structural </a:t>
-            </a:r>
-            <a:r>
-              <a:rPr lang="en-US" sz="1600" b="1" dirty="0" smtClean="0">
-                <a:latin typeface="Calibri" pitchFamily="34" charset="0"/>
-              </a:rPr>
-              <a:t>modules</a:t>
-            </a:r>
-            <a:endParaRPr lang="en-US" sz="1600" b="1" dirty="0">
-              <a:latin typeface="Calibri" pitchFamily="34" charset="0"/>
-            </a:endParaRPr>
+              <a:t>Structural modules</a:t>
+            </a:r>
           </a:p>
         </p:txBody>
       </p:sp>
@@ -3218,7 +3640,7 @@
           <a:lstStyle/>
           <a:p>
             <a:r>
-              <a:rPr lang="en-US" sz="1600" dirty="0" smtClean="0">
+              <a:rPr lang="en-US" sz="1600" dirty="0">
                 <a:solidFill>
                   <a:srgbClr val="7E1F7E"/>
                 </a:solidFill>
@@ -3228,18 +3650,13 @@
           </a:p>
           <a:p>
             <a:r>
-              <a:rPr lang="en-US" sz="1600" dirty="0" smtClean="0">
+              <a:rPr lang="en-US" sz="1600" dirty="0">
                 <a:solidFill>
                   <a:srgbClr val="7E1F7E"/>
                 </a:solidFill>
               </a:rPr>
               <a:t>topic.mod</a:t>
             </a:r>
-            <a:endParaRPr lang="en-US" sz="1600" dirty="0">
-              <a:solidFill>
-                <a:srgbClr val="7E1F7E"/>
-              </a:solidFill>
-            </a:endParaRPr>
           </a:p>
         </p:txBody>
       </p:sp>
@@ -3287,7 +3704,7 @@
           <a:lstStyle/>
           <a:p>
             <a:r>
-              <a:rPr lang="en-US" sz="1600" dirty="0" smtClean="0">
+              <a:rPr lang="en-US" sz="1600" dirty="0">
                 <a:solidFill>
                   <a:srgbClr val="7E1F7E"/>
                 </a:solidFill>
@@ -3297,18 +3714,13 @@
           </a:p>
           <a:p>
             <a:r>
-              <a:rPr lang="en-US" sz="1600" dirty="0" smtClean="0">
+              <a:rPr lang="en-US" sz="1600" dirty="0">
                 <a:solidFill>
                   <a:srgbClr val="7E1F7E"/>
                 </a:solidFill>
               </a:rPr>
               <a:t>myTopic.mod</a:t>
             </a:r>
-            <a:endParaRPr lang="en-US" sz="1600" dirty="0">
-              <a:solidFill>
-                <a:srgbClr val="7E1F7E"/>
-              </a:solidFill>
-            </a:endParaRPr>
           </a:p>
         </p:txBody>
       </p:sp>
@@ -3355,16 +3767,10 @@
           <a:lstStyle/>
           <a:p>
             <a:r>
-              <a:rPr lang="en-US" b="1" dirty="0" smtClean="0">
-                <a:latin typeface="Calibri" pitchFamily="34" charset="0"/>
-              </a:rPr>
-              <a:t>Document-type </a:t>
-            </a:r>
-            <a:r>
               <a:rPr lang="en-US" b="1" dirty="0">
                 <a:latin typeface="Calibri" pitchFamily="34" charset="0"/>
               </a:rPr>
-              <a:t>shell </a:t>
+              <a:t>Document-type shell </a:t>
             </a:r>
           </a:p>
         </p:txBody>
@@ -3417,18 +3823,13 @@
           <a:p>
             <a:pPr algn="ctr"/>
             <a:r>
-              <a:rPr lang="en-US" sz="1600" dirty="0" smtClean="0">
+              <a:rPr lang="en-US" sz="1600" dirty="0">
                 <a:solidFill>
                   <a:schemeClr val="tx2"/>
                 </a:solidFill>
               </a:rPr>
               <a:t>myTopic.dtd</a:t>
             </a:r>
-            <a:endParaRPr lang="en-US" sz="1600" dirty="0">
-              <a:solidFill>
-                <a:schemeClr val="tx2"/>
-              </a:solidFill>
-            </a:endParaRPr>
           </a:p>
         </p:txBody>
       </p:sp>
@@ -3530,14 +3931,14 @@
           <a:lstStyle/>
           <a:p>
             <a:r>
-              <a:rPr lang="en-US" sz="1600" dirty="0" err="1" smtClean="0">
+              <a:rPr lang="en-US" sz="1600" dirty="0" err="1">
                 <a:solidFill>
                   <a:srgbClr val="026C02"/>
                 </a:solidFill>
               </a:rPr>
               <a:t>myTopic.dita</a:t>
             </a:r>
-            <a:endParaRPr lang="en-US" sz="1600" dirty="0" smtClean="0">
+            <a:endParaRPr lang="en-US" sz="1600" dirty="0">
               <a:solidFill>
                 <a:srgbClr val="026C02"/>
               </a:solidFill>
@@ -3545,7 +3946,7 @@
           </a:p>
           <a:p>
             <a:r>
-              <a:rPr lang="en-US" sz="1400" dirty="0" smtClean="0">
+              <a:rPr lang="en-US" sz="1400" dirty="0">
                 <a:solidFill>
                   <a:srgbClr val="026C02"/>
                 </a:solidFill>
@@ -3555,7 +3956,7 @@
               <a:t>&lt;!DOCTYPE </a:t>
             </a:r>
             <a:r>
-              <a:rPr lang="en-US" sz="1400" dirty="0" err="1" smtClean="0">
+              <a:rPr lang="en-US" sz="1400" dirty="0" err="1">
                 <a:solidFill>
                   <a:srgbClr val="026C02"/>
                 </a:solidFill>
@@ -3565,7 +3966,7 @@
               <a:t>myTopic</a:t>
             </a:r>
             <a:r>
-              <a:rPr lang="en-US" sz="1400" dirty="0" smtClean="0">
+              <a:rPr lang="en-US" sz="1400" dirty="0">
                 <a:solidFill>
                   <a:srgbClr val="026C02"/>
                 </a:solidFill>
@@ -3577,7 +3978,7 @@
           </a:p>
           <a:p>
             <a:r>
-              <a:rPr lang="en-US" sz="1400" dirty="0" smtClean="0">
+              <a:rPr lang="en-US" sz="1400" dirty="0">
                 <a:solidFill>
                   <a:srgbClr val="026C02"/>
                 </a:solidFill>
@@ -3587,7 +3988,7 @@
               <a:t>&lt;</a:t>
             </a:r>
             <a:r>
-              <a:rPr lang="en-US" sz="1400" dirty="0" err="1" smtClean="0">
+              <a:rPr lang="en-US" sz="1400" dirty="0" err="1">
                 <a:solidFill>
                   <a:srgbClr val="026C02"/>
                 </a:solidFill>
@@ -3597,7 +3998,7 @@
               <a:t>myTopic</a:t>
             </a:r>
             <a:r>
-              <a:rPr lang="en-US" sz="1400" dirty="0" smtClean="0">
+              <a:rPr lang="en-US" sz="1400" dirty="0">
                 <a:solidFill>
                   <a:srgbClr val="026C02"/>
                 </a:solidFill>
@@ -3607,7 +4008,7 @@
               <a:t>&gt; ... &lt;/</a:t>
             </a:r>
             <a:r>
-              <a:rPr lang="en-US" sz="1400" dirty="0" err="1" smtClean="0">
+              <a:rPr lang="en-US" sz="1400" dirty="0" err="1">
                 <a:solidFill>
                   <a:srgbClr val="026C02"/>
                 </a:solidFill>
@@ -3617,7 +4018,7 @@
               <a:t>myTopic</a:t>
             </a:r>
             <a:r>
-              <a:rPr lang="en-US" sz="1400" dirty="0" smtClean="0">
+              <a:rPr lang="en-US" sz="1400" dirty="0">
                 <a:solidFill>
                   <a:srgbClr val="026C02"/>
                 </a:solidFill>
@@ -3626,13 +4027,6 @@
               </a:rPr>
               <a:t>&gt;</a:t>
             </a:r>
-            <a:endParaRPr lang="en-US" sz="1400" dirty="0">
-              <a:solidFill>
-                <a:srgbClr val="026C02"/>
-              </a:solidFill>
-              <a:latin typeface="Courier New" pitchFamily="49" charset="0"/>
-              <a:cs typeface="Courier New" pitchFamily="49" charset="0"/>
-            </a:endParaRPr>
           </a:p>
         </p:txBody>
       </p:sp>
@@ -3646,7 +4040,7 @@
         </p:nvSpPr>
         <p:spPr bwMode="auto">
           <a:xfrm>
-            <a:off x="1447800" y="4841461"/>
+            <a:off x="1066800" y="4050446"/>
             <a:ext cx="2057400" cy="338554"/>
           </a:xfrm>
           <a:prstGeom prst="rect">
@@ -3679,14 +4073,11 @@
           <a:lstStyle/>
           <a:p>
             <a:r>
-              <a:rPr lang="en-US" sz="1600" b="1" dirty="0" smtClean="0">
+              <a:rPr lang="en-US" sz="1600" b="1" dirty="0">
                 <a:latin typeface="Calibri" pitchFamily="34" charset="0"/>
               </a:rPr>
               <a:t>Constraint module</a:t>
             </a:r>
-            <a:endParaRPr lang="en-US" sz="1600" b="1" dirty="0">
-              <a:latin typeface="Calibri" pitchFamily="34" charset="0"/>
-            </a:endParaRPr>
           </a:p>
         </p:txBody>
       </p:sp>
@@ -3698,7 +4089,7 @@
         </p:nvSpPr>
         <p:spPr>
           <a:xfrm>
-            <a:off x="1554162" y="5197477"/>
+            <a:off x="1173162" y="4406462"/>
             <a:ext cx="2636838" cy="838200"/>
           </a:xfrm>
           <a:prstGeom prst="foldedCorner">
@@ -3739,18 +4130,13 @@
           <a:lstStyle/>
           <a:p>
             <a:r>
-              <a:rPr lang="en-US" sz="1600" dirty="0" smtClean="0">
+              <a:rPr lang="en-US" sz="1600" dirty="0">
                 <a:solidFill>
                   <a:schemeClr val="tx2"/>
                 </a:solidFill>
               </a:rPr>
               <a:t>strictMyTopicConstraint.mod</a:t>
             </a:r>
-            <a:endParaRPr lang="en-US" sz="1600" dirty="0">
-              <a:solidFill>
-                <a:schemeClr val="tx2"/>
-              </a:solidFill>
-            </a:endParaRPr>
           </a:p>
         </p:txBody>
       </p:sp>
@@ -3851,7 +4237,7 @@
           <a:lstStyle/>
           <a:p>
             <a:r>
-              <a:rPr lang="en-US" sz="1600" dirty="0" smtClean="0">
+              <a:rPr lang="en-US" sz="1600" dirty="0">
                 <a:solidFill>
                   <a:srgbClr val="7E1F7E"/>
                 </a:solidFill>
@@ -3861,18 +4247,13 @@
           </a:p>
           <a:p>
             <a:r>
-              <a:rPr lang="en-US" sz="1600" dirty="0" smtClean="0">
+              <a:rPr lang="en-US" sz="1600" dirty="0">
                 <a:solidFill>
                   <a:srgbClr val="7E1F7E"/>
                 </a:solidFill>
               </a:rPr>
               <a:t>programmingDomain.mod</a:t>
             </a:r>
-            <a:endParaRPr lang="en-US" sz="1600" dirty="0">
-              <a:solidFill>
-                <a:srgbClr val="7E1F7E"/>
-              </a:solidFill>
-            </a:endParaRPr>
           </a:p>
         </p:txBody>
       </p:sp>
@@ -3922,7 +4303,7 @@
           <a:lstStyle/>
           <a:p>
             <a:r>
-              <a:rPr lang="en-US" sz="1600" dirty="0" smtClean="0">
+              <a:rPr lang="en-US" sz="1600" dirty="0">
                 <a:solidFill>
                   <a:srgbClr val="7E1F7E"/>
                 </a:solidFill>
@@ -3932,18 +4313,13 @@
           </a:p>
           <a:p>
             <a:r>
-              <a:rPr lang="en-US" sz="1600" dirty="0" smtClean="0">
+              <a:rPr lang="en-US" sz="1600" dirty="0">
                 <a:solidFill>
                   <a:srgbClr val="7E1F7E"/>
                 </a:solidFill>
               </a:rPr>
               <a:t>highlightDomain.mod</a:t>
             </a:r>
-            <a:endParaRPr lang="en-US" sz="1600" dirty="0">
-              <a:solidFill>
-                <a:srgbClr val="7E1F7E"/>
-              </a:solidFill>
-            </a:endParaRPr>
           </a:p>
         </p:txBody>
       </p:sp>
@@ -3993,7 +4369,7 @@
           <a:lstStyle/>
           <a:p>
             <a:r>
-              <a:rPr lang="en-US" sz="1600" dirty="0" smtClean="0">
+              <a:rPr lang="en-US" sz="1600" dirty="0">
                 <a:solidFill>
                   <a:srgbClr val="7E1F7E"/>
                 </a:solidFill>
@@ -4003,7 +4379,7 @@
           </a:p>
           <a:p>
             <a:r>
-              <a:rPr lang="en-US" sz="1600" dirty="0" smtClean="0">
+              <a:rPr lang="en-US" sz="1600" dirty="0">
                 <a:solidFill>
                   <a:srgbClr val="7E1F7E"/>
                 </a:solidFill>
@@ -4315,14 +4691,15 @@
         <p:nvCxnSpPr>
           <p:cNvPr id="82" name="Straight Arrow Connector 81"/>
           <p:cNvCxnSpPr>
+            <a:cxnSpLocks/>
             <a:stCxn id="28" idx="2"/>
           </p:cNvCxnSpPr>
           <p:nvPr/>
         </p:nvCxnSpPr>
         <p:spPr>
           <a:xfrm flipH="1">
-            <a:off x="3429000" y="3691354"/>
-            <a:ext cx="115888" cy="1490246"/>
+            <a:off x="3048000" y="3691354"/>
+            <a:ext cx="496888" cy="674480"/>
           </a:xfrm>
           <a:prstGeom prst="straightConnector1">
             <a:avLst/>
@@ -4367,6 +4744,179 @@
           <a:ln w="19050">
             <a:solidFill>
               <a:srgbClr val="026C02"/>
+            </a:solidFill>
+            <a:headEnd type="none" w="med" len="med"/>
+            <a:tailEnd type="triangle" w="med" len="med"/>
+          </a:ln>
+        </p:spPr>
+        <p:style>
+          <a:lnRef idx="1">
+            <a:schemeClr val="accent1"/>
+          </a:lnRef>
+          <a:fillRef idx="0">
+            <a:schemeClr val="accent1"/>
+          </a:fillRef>
+          <a:effectRef idx="0">
+            <a:schemeClr val="accent1"/>
+          </a:effectRef>
+          <a:fontRef idx="minor">
+            <a:schemeClr val="tx1"/>
+          </a:fontRef>
+        </p:style>
+      </p:cxnSp>
+      <p:sp>
+        <p:nvSpPr>
+          <p:cNvPr id="3" name="TextBox 34">
+            <a:extLst>
+              <a:ext uri="{FF2B5EF4-FFF2-40B4-BE49-F238E27FC236}">
+                <a16:creationId xmlns:a16="http://schemas.microsoft.com/office/drawing/2014/main" id="{C9C1D32E-0B8F-EE5B-692B-FCA902CDA06D}"/>
+              </a:ext>
+            </a:extLst>
+          </p:cNvPr>
+          <p:cNvSpPr txBox="1">
+            <a:spLocks noChangeArrowheads="1"/>
+          </p:cNvSpPr>
+          <p:nvPr/>
+        </p:nvSpPr>
+        <p:spPr bwMode="auto">
+          <a:xfrm>
+            <a:off x="1824037" y="5262124"/>
+            <a:ext cx="2057400" cy="338554"/>
+          </a:xfrm>
+          <a:prstGeom prst="rect">
+            <a:avLst/>
+          </a:prstGeom>
+          <a:ln>
+            <a:noFill/>
+            <a:headEnd/>
+            <a:tailEnd/>
+          </a:ln>
+        </p:spPr>
+        <p:style>
+          <a:lnRef idx="2">
+            <a:schemeClr val="dk1"/>
+          </a:lnRef>
+          <a:fillRef idx="1">
+            <a:schemeClr val="lt1"/>
+          </a:fillRef>
+          <a:effectRef idx="0">
+            <a:schemeClr val="dk1"/>
+          </a:effectRef>
+          <a:fontRef idx="minor">
+            <a:schemeClr val="dk1"/>
+          </a:fontRef>
+        </p:style>
+        <p:txBody>
+          <a:bodyPr wrap="square">
+            <a:spAutoFit/>
+          </a:bodyPr>
+          <a:lstStyle/>
+          <a:p>
+            <a:r>
+              <a:rPr lang="en-US" sz="1600" b="1" dirty="0">
+                <a:latin typeface="Calibri" pitchFamily="34" charset="0"/>
+              </a:rPr>
+              <a:t>Expansion module</a:t>
+            </a:r>
+          </a:p>
+        </p:txBody>
+      </p:sp>
+      <p:sp>
+        <p:nvSpPr>
+          <p:cNvPr id="4" name="Folded Corner 3">
+            <a:extLst>
+              <a:ext uri="{FF2B5EF4-FFF2-40B4-BE49-F238E27FC236}">
+                <a16:creationId xmlns:a16="http://schemas.microsoft.com/office/drawing/2014/main" id="{05030D77-8159-C3D0-FC8B-447C449F6B67}"/>
+              </a:ext>
+            </a:extLst>
+          </p:cNvPr>
+          <p:cNvSpPr/>
+          <p:nvPr/>
+        </p:nvSpPr>
+        <p:spPr>
+          <a:xfrm>
+            <a:off x="1752600" y="5618140"/>
+            <a:ext cx="2814637" cy="838200"/>
+          </a:xfrm>
+          <a:prstGeom prst="foldedCorner">
+            <a:avLst>
+              <a:gd name="adj" fmla="val 28641"/>
+            </a:avLst>
+          </a:prstGeom>
+          <a:solidFill>
+            <a:schemeClr val="accent1">
+              <a:lumMod val="20000"/>
+              <a:lumOff val="80000"/>
+            </a:schemeClr>
+          </a:solidFill>
+          <a:ln>
+            <a:solidFill>
+              <a:schemeClr val="tx2"/>
+            </a:solidFill>
+          </a:ln>
+        </p:spPr>
+        <p:style>
+          <a:lnRef idx="2">
+            <a:schemeClr val="accent1">
+              <a:shade val="50000"/>
+            </a:schemeClr>
+          </a:lnRef>
+          <a:fillRef idx="1">
+            <a:schemeClr val="accent1"/>
+          </a:fillRef>
+          <a:effectRef idx="0">
+            <a:schemeClr val="accent1"/>
+          </a:effectRef>
+          <a:fontRef idx="minor">
+            <a:schemeClr val="lt1"/>
+          </a:fontRef>
+        </p:style>
+        <p:txBody>
+          <a:bodyPr bIns="0" rtlCol="0" anchor="t"/>
+          <a:lstStyle/>
+          <a:p>
+            <a:r>
+              <a:rPr lang="en-US" sz="1400" dirty="0" err="1">
+                <a:solidFill>
+                  <a:schemeClr val="tx2"/>
+                </a:solidFill>
+              </a:rPr>
+              <a:t>allowEmphMyTopicExpansion.mod</a:t>
+            </a:r>
+            <a:endParaRPr lang="en-US" sz="1400" dirty="0">
+              <a:solidFill>
+                <a:schemeClr val="tx2"/>
+              </a:solidFill>
+            </a:endParaRPr>
+          </a:p>
+        </p:txBody>
+      </p:sp>
+      <p:cxnSp>
+        <p:nvCxnSpPr>
+          <p:cNvPr id="5" name="Straight Arrow Connector 4">
+            <a:extLst>
+              <a:ext uri="{FF2B5EF4-FFF2-40B4-BE49-F238E27FC236}">
+                <a16:creationId xmlns:a16="http://schemas.microsoft.com/office/drawing/2014/main" id="{5F1D4983-99E1-19E0-A618-F3A2CECA2A72}"/>
+              </a:ext>
+            </a:extLst>
+          </p:cNvPr>
+          <p:cNvCxnSpPr>
+            <a:cxnSpLocks/>
+            <a:stCxn id="28" idx="2"/>
+          </p:cNvCxnSpPr>
+          <p:nvPr/>
+        </p:nvCxnSpPr>
+        <p:spPr>
+          <a:xfrm>
+            <a:off x="3544888" y="3691354"/>
+            <a:ext cx="874711" cy="1909324"/>
+          </a:xfrm>
+          <a:prstGeom prst="straightConnector1">
+            <a:avLst/>
+          </a:prstGeom>
+          <a:ln w="19050">
+            <a:solidFill>
+              <a:schemeClr val="accent1"/>
             </a:solidFill>
             <a:headEnd type="none" w="med" len="med"/>
             <a:tailEnd type="triangle" w="med" len="med"/>
@@ -4578,16 +5128,10 @@
           <a:lstStyle/>
           <a:p>
             <a:r>
-              <a:rPr lang="en-US" sz="1600" dirty="0" smtClean="0">
-                <a:latin typeface="Calibri" pitchFamily="34" charset="0"/>
-              </a:rPr>
-              <a:t>Document-type </a:t>
-            </a:r>
-            <a:r>
               <a:rPr lang="en-US" sz="1600" dirty="0">
                 <a:latin typeface="Calibri" pitchFamily="34" charset="0"/>
               </a:rPr>
-              <a:t>shell </a:t>
+              <a:t>Document-type shell </a:t>
             </a:r>
           </a:p>
         </p:txBody>
@@ -4689,17 +5233,8 @@
               <a:rPr lang="en-US" sz="1600" dirty="0">
                 <a:latin typeface="Calibri" pitchFamily="34" charset="0"/>
               </a:rPr>
-              <a:t>Structural </a:t>
-            </a:r>
-            <a:r>
-              <a:rPr lang="en-US" sz="1600" dirty="0" smtClean="0">
-                <a:latin typeface="Calibri" pitchFamily="34" charset="0"/>
-              </a:rPr>
-              <a:t>modules</a:t>
-            </a:r>
-            <a:endParaRPr lang="en-US" sz="1600" dirty="0">
-              <a:latin typeface="Calibri" pitchFamily="34" charset="0"/>
-            </a:endParaRPr>
+              <a:t>Structural modules</a:t>
+            </a:r>
           </a:p>
           <a:p>
             <a:r>
@@ -4875,14 +5410,11 @@
           <a:lstStyle/>
           <a:p>
             <a:r>
-              <a:rPr lang="en-US" sz="1600" dirty="0" smtClean="0">
+              <a:rPr lang="en-US" sz="1600" dirty="0">
                 <a:latin typeface="Calibri" pitchFamily="34" charset="0"/>
               </a:rPr>
               <a:t>Constraint module</a:t>
             </a:r>
-            <a:endParaRPr lang="en-US" sz="1600" dirty="0">
-              <a:latin typeface="Calibri" pitchFamily="34" charset="0"/>
-            </a:endParaRPr>
           </a:p>
         </p:txBody>
       </p:sp>
@@ -5300,7 +5832,7 @@
           <a:lstStyle/>
           <a:p>
             <a:r>
-              <a:rPr lang="en-US" dirty="0" smtClean="0">
+              <a:rPr lang="en-US" dirty="0">
                 <a:solidFill>
                   <a:srgbClr val="7E1F7E"/>
                 </a:solidFill>
@@ -5310,18 +5842,13 @@
           </a:p>
           <a:p>
             <a:r>
-              <a:rPr lang="en-US" dirty="0" smtClean="0">
+              <a:rPr lang="en-US" dirty="0">
                 <a:solidFill>
                   <a:srgbClr val="7E1F7E"/>
                 </a:solidFill>
               </a:rPr>
               <a:t>topic.mod</a:t>
             </a:r>
-            <a:endParaRPr lang="en-US" dirty="0">
-              <a:solidFill>
-                <a:srgbClr val="7E1F7E"/>
-              </a:solidFill>
-            </a:endParaRPr>
           </a:p>
         </p:txBody>
       </p:sp>
@@ -5364,7 +5891,7 @@
           <a:lstStyle/>
           <a:p>
             <a:r>
-              <a:rPr lang="en-US" dirty="0" smtClean="0">
+              <a:rPr lang="en-US" dirty="0">
                 <a:solidFill>
                   <a:srgbClr val="7E1F7E"/>
                 </a:solidFill>
@@ -5374,18 +5901,13 @@
           </a:p>
           <a:p>
             <a:r>
-              <a:rPr lang="en-US" dirty="0" smtClean="0">
+              <a:rPr lang="en-US" dirty="0">
                 <a:solidFill>
                   <a:srgbClr val="7E1F7E"/>
                 </a:solidFill>
               </a:rPr>
               <a:t>myTopic.mod</a:t>
             </a:r>
-            <a:endParaRPr lang="en-US" dirty="0">
-              <a:solidFill>
-                <a:srgbClr val="7E1F7E"/>
-              </a:solidFill>
-            </a:endParaRPr>
           </a:p>
         </p:txBody>
       </p:sp>
@@ -5428,18 +5950,13 @@
           <a:lstStyle/>
           <a:p>
             <a:r>
-              <a:rPr lang="en-US" dirty="0" smtClean="0">
+              <a:rPr lang="en-US" dirty="0">
                 <a:solidFill>
                   <a:srgbClr val="7E1F7E"/>
                 </a:solidFill>
               </a:rPr>
               <a:t>myTopic.dtd</a:t>
             </a:r>
-            <a:endParaRPr lang="en-US" dirty="0">
-              <a:solidFill>
-                <a:srgbClr val="7E1F7E"/>
-              </a:solidFill>
-            </a:endParaRPr>
           </a:p>
         </p:txBody>
       </p:sp>
@@ -5482,21 +5999,21 @@
           <a:lstStyle/>
           <a:p>
             <a:r>
-              <a:rPr lang="en-US" dirty="0" err="1" smtClean="0">
+              <a:rPr lang="en-US" dirty="0" err="1">
                 <a:solidFill>
                   <a:srgbClr val="7E1F7E"/>
                 </a:solidFill>
               </a:rPr>
               <a:t>myTopic.dita</a:t>
             </a:r>
-            <a:endParaRPr lang="en-US" dirty="0" smtClean="0">
+            <a:endParaRPr lang="en-US" dirty="0">
               <a:solidFill>
                 <a:srgbClr val="7E1F7E"/>
               </a:solidFill>
             </a:endParaRPr>
           </a:p>
           <a:p>
-            <a:endParaRPr lang="en-US" sz="1400" dirty="0" smtClean="0">
+            <a:endParaRPr lang="en-US" sz="1400" dirty="0">
               <a:solidFill>
                 <a:srgbClr val="7E1F7E"/>
               </a:solidFill>
@@ -5506,7 +6023,7 @@
           </a:p>
           <a:p>
             <a:r>
-              <a:rPr lang="en-US" sz="1400" dirty="0" smtClean="0">
+              <a:rPr lang="en-US" sz="1400" dirty="0">
                 <a:solidFill>
                   <a:srgbClr val="7E1F7E"/>
                 </a:solidFill>
@@ -5516,7 +6033,7 @@
               <a:t>&lt;!DOCTYPE </a:t>
             </a:r>
             <a:r>
-              <a:rPr lang="en-US" sz="1400" dirty="0" err="1" smtClean="0">
+              <a:rPr lang="en-US" sz="1400" dirty="0" err="1">
                 <a:solidFill>
                   <a:srgbClr val="7E1F7E"/>
                 </a:solidFill>
@@ -5526,7 +6043,7 @@
               <a:t>myTopic</a:t>
             </a:r>
             <a:r>
-              <a:rPr lang="en-US" sz="1400" dirty="0" smtClean="0">
+              <a:rPr lang="en-US" sz="1400" dirty="0">
                 <a:solidFill>
                   <a:srgbClr val="7E1F7E"/>
                 </a:solidFill>
@@ -5538,7 +6055,7 @@
           </a:p>
           <a:p>
             <a:r>
-              <a:rPr lang="en-US" sz="1400" dirty="0" smtClean="0">
+              <a:rPr lang="en-US" sz="1400" dirty="0">
                 <a:solidFill>
                   <a:srgbClr val="7E1F7E"/>
                 </a:solidFill>
@@ -5548,7 +6065,7 @@
               <a:t>&lt;</a:t>
             </a:r>
             <a:r>
-              <a:rPr lang="en-US" sz="1400" dirty="0" err="1" smtClean="0">
+              <a:rPr lang="en-US" sz="1400" dirty="0" err="1">
                 <a:solidFill>
                   <a:srgbClr val="7E1F7E"/>
                 </a:solidFill>
@@ -5558,7 +6075,7 @@
               <a:t>myTopic</a:t>
             </a:r>
             <a:r>
-              <a:rPr lang="en-US" sz="1400" dirty="0" smtClean="0">
+              <a:rPr lang="en-US" sz="1400" dirty="0">
                 <a:solidFill>
                   <a:srgbClr val="7E1F7E"/>
                 </a:solidFill>
@@ -5570,7 +6087,7 @@
           </a:p>
           <a:p>
             <a:r>
-              <a:rPr lang="en-US" sz="1400" dirty="0" smtClean="0">
+              <a:rPr lang="en-US" sz="1400" dirty="0">
                 <a:solidFill>
                   <a:srgbClr val="7E1F7E"/>
                 </a:solidFill>
@@ -5582,7 +6099,7 @@
           </a:p>
           <a:p>
             <a:r>
-              <a:rPr lang="en-US" sz="1400" dirty="0" smtClean="0">
+              <a:rPr lang="en-US" sz="1400" dirty="0">
                 <a:solidFill>
                   <a:srgbClr val="7E1F7E"/>
                 </a:solidFill>
@@ -5592,7 +6109,7 @@
               <a:t>&lt;/</a:t>
             </a:r>
             <a:r>
-              <a:rPr lang="en-US" sz="1400" dirty="0" err="1" smtClean="0">
+              <a:rPr lang="en-US" sz="1400" dirty="0" err="1">
                 <a:solidFill>
                   <a:srgbClr val="7E1F7E"/>
                 </a:solidFill>
@@ -5652,7 +6169,7 @@
           <a:lstStyle/>
           <a:p>
             <a:r>
-              <a:rPr lang="en-US" dirty="0" smtClean="0">
+              <a:rPr lang="en-US" dirty="0">
                 <a:solidFill>
                   <a:srgbClr val="7E1F7E"/>
                 </a:solidFill>
@@ -5662,18 +6179,13 @@
           </a:p>
           <a:p>
             <a:r>
-              <a:rPr lang="en-US" dirty="0" smtClean="0">
+              <a:rPr lang="en-US" dirty="0">
                 <a:solidFill>
                   <a:srgbClr val="7E1F7E"/>
                 </a:solidFill>
               </a:rPr>
               <a:t>programmingDomain.mod</a:t>
             </a:r>
-            <a:endParaRPr lang="en-US" dirty="0">
-              <a:solidFill>
-                <a:srgbClr val="7E1F7E"/>
-              </a:solidFill>
-            </a:endParaRPr>
           </a:p>
         </p:txBody>
       </p:sp>
@@ -5718,7 +6230,7 @@
           <a:lstStyle/>
           <a:p>
             <a:r>
-              <a:rPr lang="en-US" dirty="0" smtClean="0">
+              <a:rPr lang="en-US" dirty="0">
                 <a:solidFill>
                   <a:srgbClr val="7E1F7E"/>
                 </a:solidFill>
@@ -5728,18 +6240,13 @@
           </a:p>
           <a:p>
             <a:r>
-              <a:rPr lang="en-US" dirty="0" smtClean="0">
+              <a:rPr lang="en-US" dirty="0">
                 <a:solidFill>
                   <a:srgbClr val="7E1F7E"/>
                 </a:solidFill>
               </a:rPr>
               <a:t>highlightDomain.mod</a:t>
             </a:r>
-            <a:endParaRPr lang="en-US" dirty="0">
-              <a:solidFill>
-                <a:srgbClr val="7E1F7E"/>
-              </a:solidFill>
-            </a:endParaRPr>
           </a:p>
         </p:txBody>
       </p:sp>
@@ -5784,18 +6291,13 @@
           <a:lstStyle/>
           <a:p>
             <a:r>
-              <a:rPr lang="en-US" dirty="0" smtClean="0">
+              <a:rPr lang="en-US" dirty="0">
                 <a:solidFill>
                   <a:srgbClr val="7E1F7E"/>
                 </a:solidFill>
               </a:rPr>
               <a:t>strictMyTopicConstraint.mod</a:t>
             </a:r>
-            <a:endParaRPr lang="en-US" dirty="0">
-              <a:solidFill>
-                <a:srgbClr val="7E1F7E"/>
-              </a:solidFill>
-            </a:endParaRPr>
           </a:p>
         </p:txBody>
       </p:sp>
@@ -5840,7 +6342,7 @@
           <a:lstStyle/>
           <a:p>
             <a:r>
-              <a:rPr lang="en-US" dirty="0" smtClean="0">
+              <a:rPr lang="en-US" dirty="0">
                 <a:solidFill>
                   <a:srgbClr val="7E1F7E"/>
                 </a:solidFill>
@@ -5850,7 +6352,7 @@
           </a:p>
           <a:p>
             <a:r>
-              <a:rPr lang="en-US" dirty="0" smtClean="0">
+              <a:rPr lang="en-US" dirty="0">
                 <a:solidFill>
                   <a:srgbClr val="7E1F7E"/>
                 </a:solidFill>
@@ -6156,4 +6658,299 @@
   <a:objectDefaults/>
   <a:extraClrSchemeLst/>
 </a:theme>
+</file>
+
+<file path=ppt/theme/theme2.xml><?xml version="1.0" encoding="utf-8"?>
+<a:theme xmlns:a="http://schemas.openxmlformats.org/drawingml/2006/main" name="Office Theme">
+  <a:themeElements>
+    <a:clrScheme name="Office">
+      <a:dk1>
+        <a:sysClr val="windowText" lastClr="000000"/>
+      </a:dk1>
+      <a:lt1>
+        <a:sysClr val="window" lastClr="FFFFFF"/>
+      </a:lt1>
+      <a:dk2>
+        <a:srgbClr val="44546A"/>
+      </a:dk2>
+      <a:lt2>
+        <a:srgbClr val="E7E6E6"/>
+      </a:lt2>
+      <a:accent1>
+        <a:srgbClr val="4472C4"/>
+      </a:accent1>
+      <a:accent2>
+        <a:srgbClr val="ED7D31"/>
+      </a:accent2>
+      <a:accent3>
+        <a:srgbClr val="A5A5A5"/>
+      </a:accent3>
+      <a:accent4>
+        <a:srgbClr val="FFC000"/>
+      </a:accent4>
+      <a:accent5>
+        <a:srgbClr val="5B9BD5"/>
+      </a:accent5>
+      <a:accent6>
+        <a:srgbClr val="70AD47"/>
+      </a:accent6>
+      <a:hlink>
+        <a:srgbClr val="0563C1"/>
+      </a:hlink>
+      <a:folHlink>
+        <a:srgbClr val="954F72"/>
+      </a:folHlink>
+    </a:clrScheme>
+    <a:fontScheme name="Office">
+      <a:majorFont>
+        <a:latin typeface="Calibri Light" panose="020F0302020204030204"/>
+        <a:ea typeface=""/>
+        <a:cs typeface=""/>
+        <a:font script="Jpan" typeface="游ゴシック Light"/>
+        <a:font script="Hang" typeface="맑은 고딕"/>
+        <a:font script="Hans" typeface="等线 Light"/>
+        <a:font script="Hant" typeface="新細明體"/>
+        <a:font script="Arab" typeface="Times New Roman"/>
+        <a:font script="Hebr" typeface="Times New Roman"/>
+        <a:font script="Thai" typeface="Angsana New"/>
+        <a:font script="Ethi" typeface="Nyala"/>
+        <a:font script="Beng" typeface="Vrinda"/>
+        <a:font script="Gujr" typeface="Shruti"/>
+        <a:font script="Khmr" typeface="MoolBoran"/>
+        <a:font script="Knda" typeface="Tunga"/>
+        <a:font script="Guru" typeface="Raavi"/>
+        <a:font script="Cans" typeface="Euphemia"/>
+        <a:font script="Cher" typeface="Plantagenet Cherokee"/>
+        <a:font script="Yiii" typeface="Microsoft Yi Baiti"/>
+        <a:font script="Tibt" typeface="Microsoft Himalaya"/>
+        <a:font script="Thaa" typeface="MV Boli"/>
+        <a:font script="Deva" typeface="Mangal"/>
+        <a:font script="Telu" typeface="Gautami"/>
+        <a:font script="Taml" typeface="Latha"/>
+        <a:font script="Syrc" typeface="Estrangelo Edessa"/>
+        <a:font script="Orya" typeface="Kalinga"/>
+        <a:font script="Mlym" typeface="Kartika"/>
+        <a:font script="Laoo" typeface="DokChampa"/>
+        <a:font script="Sinh" typeface="Iskoola Pota"/>
+        <a:font script="Mong" typeface="Mongolian Baiti"/>
+        <a:font script="Viet" typeface="Times New Roman"/>
+        <a:font script="Uigh" typeface="Microsoft Uighur"/>
+        <a:font script="Geor" typeface="Sylfaen"/>
+        <a:font script="Armn" typeface="Arial"/>
+        <a:font script="Bugi" typeface="Leelawadee UI"/>
+        <a:font script="Bopo" typeface="Microsoft JhengHei"/>
+        <a:font script="Java" typeface="Javanese Text"/>
+        <a:font script="Lisu" typeface="Segoe UI"/>
+        <a:font script="Mymr" typeface="Myanmar Text"/>
+        <a:font script="Nkoo" typeface="Ebrima"/>
+        <a:font script="Olck" typeface="Nirmala UI"/>
+        <a:font script="Osma" typeface="Ebrima"/>
+        <a:font script="Phag" typeface="Phagspa"/>
+        <a:font script="Syrn" typeface="Estrangelo Edessa"/>
+        <a:font script="Syrj" typeface="Estrangelo Edessa"/>
+        <a:font script="Syre" typeface="Estrangelo Edessa"/>
+        <a:font script="Sora" typeface="Nirmala UI"/>
+        <a:font script="Tale" typeface="Microsoft Tai Le"/>
+        <a:font script="Talu" typeface="Microsoft New Tai Lue"/>
+        <a:font script="Tfng" typeface="Ebrima"/>
+      </a:majorFont>
+      <a:minorFont>
+        <a:latin typeface="Calibri" panose="020F0502020204030204"/>
+        <a:ea typeface=""/>
+        <a:cs typeface=""/>
+        <a:font script="Jpan" typeface="游ゴシック"/>
+        <a:font script="Hang" typeface="맑은 고딕"/>
+        <a:font script="Hans" typeface="等线"/>
+        <a:font script="Hant" typeface="新細明體"/>
+        <a:font script="Arab" typeface="Arial"/>
+        <a:font script="Hebr" typeface="Arial"/>
+        <a:font script="Thai" typeface="Cordia New"/>
+        <a:font script="Ethi" typeface="Nyala"/>
+        <a:font script="Beng" typeface="Vrinda"/>
+        <a:font script="Gujr" typeface="Shruti"/>
+        <a:font script="Khmr" typeface="DaunPenh"/>
+        <a:font script="Knda" typeface="Tunga"/>
+        <a:font script="Guru" typeface="Raavi"/>
+        <a:font script="Cans" typeface="Euphemia"/>
+        <a:font script="Cher" typeface="Plantagenet Cherokee"/>
+        <a:font script="Yiii" typeface="Microsoft Yi Baiti"/>
+        <a:font script="Tibt" typeface="Microsoft Himalaya"/>
+        <a:font script="Thaa" typeface="MV Boli"/>
+        <a:font script="Deva" typeface="Mangal"/>
+        <a:font script="Telu" typeface="Gautami"/>
+        <a:font script="Taml" typeface="Latha"/>
+        <a:font script="Syrc" typeface="Estrangelo Edessa"/>
+        <a:font script="Orya" typeface="Kalinga"/>
+        <a:font script="Mlym" typeface="Kartika"/>
+        <a:font script="Laoo" typeface="DokChampa"/>
+        <a:font script="Sinh" typeface="Iskoola Pota"/>
+        <a:font script="Mong" typeface="Mongolian Baiti"/>
+        <a:font script="Viet" typeface="Arial"/>
+        <a:font script="Uigh" typeface="Microsoft Uighur"/>
+        <a:font script="Geor" typeface="Sylfaen"/>
+        <a:font script="Armn" typeface="Arial"/>
+        <a:font script="Bugi" typeface="Leelawadee UI"/>
+        <a:font script="Bopo" typeface="Microsoft JhengHei"/>
+        <a:font script="Java" typeface="Javanese Text"/>
+        <a:font script="Lisu" typeface="Segoe UI"/>
+        <a:font script="Mymr" typeface="Myanmar Text"/>
+        <a:font script="Nkoo" typeface="Ebrima"/>
+        <a:font script="Olck" typeface="Nirmala UI"/>
+        <a:font script="Osma" typeface="Ebrima"/>
+        <a:font script="Phag" typeface="Phagspa"/>
+        <a:font script="Syrn" typeface="Estrangelo Edessa"/>
+        <a:font script="Syrj" typeface="Estrangelo Edessa"/>
+        <a:font script="Syre" typeface="Estrangelo Edessa"/>
+        <a:font script="Sora" typeface="Nirmala UI"/>
+        <a:font script="Tale" typeface="Microsoft Tai Le"/>
+        <a:font script="Talu" typeface="Microsoft New Tai Lue"/>
+        <a:font script="Tfng" typeface="Ebrima"/>
+      </a:minorFont>
+    </a:fontScheme>
+    <a:fmtScheme name="Office">
+      <a:fillStyleLst>
+        <a:solidFill>
+          <a:schemeClr val="phClr"/>
+        </a:solidFill>
+        <a:gradFill rotWithShape="1">
+          <a:gsLst>
+            <a:gs pos="0">
+              <a:schemeClr val="phClr">
+                <a:lumMod val="110000"/>
+                <a:satMod val="105000"/>
+                <a:tint val="67000"/>
+              </a:schemeClr>
+            </a:gs>
+            <a:gs pos="50000">
+              <a:schemeClr val="phClr">
+                <a:lumMod val="105000"/>
+                <a:satMod val="103000"/>
+                <a:tint val="73000"/>
+              </a:schemeClr>
+            </a:gs>
+            <a:gs pos="100000">
+              <a:schemeClr val="phClr">
+                <a:lumMod val="105000"/>
+                <a:satMod val="109000"/>
+                <a:tint val="81000"/>
+              </a:schemeClr>
+            </a:gs>
+          </a:gsLst>
+          <a:lin ang="5400000" scaled="0"/>
+        </a:gradFill>
+        <a:gradFill rotWithShape="1">
+          <a:gsLst>
+            <a:gs pos="0">
+              <a:schemeClr val="phClr">
+                <a:satMod val="103000"/>
+                <a:lumMod val="102000"/>
+                <a:tint val="94000"/>
+              </a:schemeClr>
+            </a:gs>
+            <a:gs pos="50000">
+              <a:schemeClr val="phClr">
+                <a:satMod val="110000"/>
+                <a:lumMod val="100000"/>
+                <a:shade val="100000"/>
+              </a:schemeClr>
+            </a:gs>
+            <a:gs pos="100000">
+              <a:schemeClr val="phClr">
+                <a:lumMod val="99000"/>
+                <a:satMod val="120000"/>
+                <a:shade val="78000"/>
+              </a:schemeClr>
+            </a:gs>
+          </a:gsLst>
+          <a:lin ang="5400000" scaled="0"/>
+        </a:gradFill>
+      </a:fillStyleLst>
+      <a:lnStyleLst>
+        <a:ln w="6350" cap="flat" cmpd="sng" algn="ctr">
+          <a:solidFill>
+            <a:schemeClr val="phClr"/>
+          </a:solidFill>
+          <a:prstDash val="solid"/>
+          <a:miter lim="800000"/>
+        </a:ln>
+        <a:ln w="12700" cap="flat" cmpd="sng" algn="ctr">
+          <a:solidFill>
+            <a:schemeClr val="phClr"/>
+          </a:solidFill>
+          <a:prstDash val="solid"/>
+          <a:miter lim="800000"/>
+        </a:ln>
+        <a:ln w="19050" cap="flat" cmpd="sng" algn="ctr">
+          <a:solidFill>
+            <a:schemeClr val="phClr"/>
+          </a:solidFill>
+          <a:prstDash val="solid"/>
+          <a:miter lim="800000"/>
+        </a:ln>
+      </a:lnStyleLst>
+      <a:effectStyleLst>
+        <a:effectStyle>
+          <a:effectLst/>
+        </a:effectStyle>
+        <a:effectStyle>
+          <a:effectLst/>
+        </a:effectStyle>
+        <a:effectStyle>
+          <a:effectLst>
+            <a:outerShdw blurRad="57150" dist="19050" dir="5400000" algn="ctr" rotWithShape="0">
+              <a:srgbClr val="000000">
+                <a:alpha val="63000"/>
+              </a:srgbClr>
+            </a:outerShdw>
+          </a:effectLst>
+        </a:effectStyle>
+      </a:effectStyleLst>
+      <a:bgFillStyleLst>
+        <a:solidFill>
+          <a:schemeClr val="phClr"/>
+        </a:solidFill>
+        <a:solidFill>
+          <a:schemeClr val="phClr">
+            <a:tint val="95000"/>
+            <a:satMod val="170000"/>
+          </a:schemeClr>
+        </a:solidFill>
+        <a:gradFill rotWithShape="1">
+          <a:gsLst>
+            <a:gs pos="0">
+              <a:schemeClr val="phClr">
+                <a:tint val="93000"/>
+                <a:satMod val="150000"/>
+                <a:shade val="98000"/>
+                <a:lumMod val="102000"/>
+              </a:schemeClr>
+            </a:gs>
+            <a:gs pos="50000">
+              <a:schemeClr val="phClr">
+                <a:tint val="98000"/>
+                <a:satMod val="130000"/>
+                <a:shade val="90000"/>
+                <a:lumMod val="103000"/>
+              </a:schemeClr>
+            </a:gs>
+            <a:gs pos="100000">
+              <a:schemeClr val="phClr">
+                <a:shade val="63000"/>
+                <a:satMod val="120000"/>
+              </a:schemeClr>
+            </a:gs>
+          </a:gsLst>
+          <a:lin ang="5400000" scaled="0"/>
+        </a:gradFill>
+      </a:bgFillStyleLst>
+    </a:fmtScheme>
+  </a:themeElements>
+  <a:objectDefaults/>
+  <a:extraClrSchemeLst/>
+  <a:extLst>
+    <a:ext uri="{05A4C25C-085E-4340-85A3-A5531E510DB2}">
+      <thm15:themeFamily xmlns:thm15="http://schemas.microsoft.com/office/thememl/2012/main" name="Office Theme" id="{62F939B6-93AF-4DB8-9C6B-D6C7DFDC589F}" vid="{4A3C46E8-61CC-4603-A589-7422A47A8E4A}"/>
+    </a:ext>
+  </a:extLst>
+</a:theme>
 </file>
</xml_diff>